<commit_message>
Added Data Analytics pdf
</commit_message>
<xml_diff>
--- a/2nd Sem/Data Analytics/Notes/Data Categorization/02_DataCategorization.pptx
+++ b/2nd Sem/Data Analytics/Notes/Data Categorization/02_DataCategorization.pptx
@@ -6957,7 +6957,7 @@
           <a:p>
             <a:fld id="{7674B31D-BF62-C54C-9965-67E2F9A27B33}" type="datetimeFigureOut">
               <a:rPr lang="en-US" smtClean="0"/>
-              <a:t>8/10/2022</a:t>
+              <a:t>2/20/2023</a:t>
             </a:fld>
             <a:endParaRPr lang="en-US"/>
           </a:p>
@@ -39981,7 +39981,7 @@
         </p:blipFill>
         <p:spPr bwMode="auto">
           <a:xfrm>
-            <a:off x="2103119" y="1634490"/>
+            <a:off x="2103119" y="1646682"/>
             <a:ext cx="5022215" cy="3016644"/>
           </a:xfrm>
           <a:prstGeom prst="rect">

</xml_diff>